<commit_message>
Versión final 2 .ppt
</commit_message>
<xml_diff>
--- a/TFM_Francisco_Rodriguez.pptx
+++ b/TFM_Francisco_Rodriguez.pptx
@@ -286,7 +286,7 @@
           <a:p>
             <a:fld id="{E01746FB-99A3-4E74-B466-02D768A2850C}" type="datetimeFigureOut">
               <a:rPr lang="es-ES" smtClean="0"/>
-              <a:t>01/07/2019</a:t>
+              <a:t>02/07/2019</a:t>
             </a:fld>
             <a:endParaRPr lang="es-ES"/>
           </a:p>
@@ -463,7 +463,7 @@
           <a:p>
             <a:fld id="{EA6B01D0-CF01-4366-A8E3-2BEB399DF92F}" type="datetimeFigureOut">
               <a:rPr lang="es-ES" smtClean="0"/>
-              <a:t>01/07/2019</a:t>
+              <a:t>02/07/2019</a:t>
             </a:fld>
             <a:endParaRPr lang="es-ES"/>
           </a:p>

</xml_diff>